<commit_message>
removed "Poison Ivy" from diagram
</commit_message>
<xml_diff>
--- a/idioms/incident/related-observables/diagram.pptx
+++ b/idioms/incident/related-observables/diagram.pptx
@@ -288,7 +288,7 @@
           <a:p>
             <a:fld id="{13F24B86-36D2-4655-BE2F-98B661AC85E1}" type="datetimeFigureOut">
               <a:rPr lang="en-US" smtClean="0"/>
-              <a:t>3/19/2014</a:t>
+              <a:t>3/27/2014</a:t>
             </a:fld>
             <a:endParaRPr lang="en-US"/>
           </a:p>
@@ -458,7 +458,7 @@
           <a:p>
             <a:fld id="{13F24B86-36D2-4655-BE2F-98B661AC85E1}" type="datetimeFigureOut">
               <a:rPr lang="en-US" smtClean="0"/>
-              <a:t>3/19/2014</a:t>
+              <a:t>3/27/2014</a:t>
             </a:fld>
             <a:endParaRPr lang="en-US"/>
           </a:p>
@@ -638,7 +638,7 @@
           <a:p>
             <a:fld id="{13F24B86-36D2-4655-BE2F-98B661AC85E1}" type="datetimeFigureOut">
               <a:rPr lang="en-US" smtClean="0"/>
-              <a:t>3/19/2014</a:t>
+              <a:t>3/27/2014</a:t>
             </a:fld>
             <a:endParaRPr lang="en-US"/>
           </a:p>
@@ -808,7 +808,7 @@
           <a:p>
             <a:fld id="{13F24B86-36D2-4655-BE2F-98B661AC85E1}" type="datetimeFigureOut">
               <a:rPr lang="en-US" smtClean="0"/>
-              <a:t>3/19/2014</a:t>
+              <a:t>3/27/2014</a:t>
             </a:fld>
             <a:endParaRPr lang="en-US"/>
           </a:p>
@@ -1054,7 +1054,7 @@
           <a:p>
             <a:fld id="{13F24B86-36D2-4655-BE2F-98B661AC85E1}" type="datetimeFigureOut">
               <a:rPr lang="en-US" smtClean="0"/>
-              <a:t>3/19/2014</a:t>
+              <a:t>3/27/2014</a:t>
             </a:fld>
             <a:endParaRPr lang="en-US"/>
           </a:p>
@@ -1342,7 +1342,7 @@
           <a:p>
             <a:fld id="{13F24B86-36D2-4655-BE2F-98B661AC85E1}" type="datetimeFigureOut">
               <a:rPr lang="en-US" smtClean="0"/>
-              <a:t>3/19/2014</a:t>
+              <a:t>3/27/2014</a:t>
             </a:fld>
             <a:endParaRPr lang="en-US"/>
           </a:p>
@@ -1764,7 +1764,7 @@
           <a:p>
             <a:fld id="{13F24B86-36D2-4655-BE2F-98B661AC85E1}" type="datetimeFigureOut">
               <a:rPr lang="en-US" smtClean="0"/>
-              <a:t>3/19/2014</a:t>
+              <a:t>3/27/2014</a:t>
             </a:fld>
             <a:endParaRPr lang="en-US"/>
           </a:p>
@@ -1882,7 +1882,7 @@
           <a:p>
             <a:fld id="{13F24B86-36D2-4655-BE2F-98B661AC85E1}" type="datetimeFigureOut">
               <a:rPr lang="en-US" smtClean="0"/>
-              <a:t>3/19/2014</a:t>
+              <a:t>3/27/2014</a:t>
             </a:fld>
             <a:endParaRPr lang="en-US"/>
           </a:p>
@@ -1977,7 +1977,7 @@
           <a:p>
             <a:fld id="{13F24B86-36D2-4655-BE2F-98B661AC85E1}" type="datetimeFigureOut">
               <a:rPr lang="en-US" smtClean="0"/>
-              <a:t>3/19/2014</a:t>
+              <a:t>3/27/2014</a:t>
             </a:fld>
             <a:endParaRPr lang="en-US"/>
           </a:p>
@@ -2254,7 +2254,7 @@
           <a:p>
             <a:fld id="{13F24B86-36D2-4655-BE2F-98B661AC85E1}" type="datetimeFigureOut">
               <a:rPr lang="en-US" smtClean="0"/>
-              <a:t>3/19/2014</a:t>
+              <a:t>3/27/2014</a:t>
             </a:fld>
             <a:endParaRPr lang="en-US"/>
           </a:p>
@@ -2507,7 +2507,7 @@
           <a:p>
             <a:fld id="{13F24B86-36D2-4655-BE2F-98B661AC85E1}" type="datetimeFigureOut">
               <a:rPr lang="en-US" smtClean="0"/>
-              <a:t>3/19/2014</a:t>
+              <a:t>3/27/2014</a:t>
             </a:fld>
             <a:endParaRPr lang="en-US"/>
           </a:p>
@@ -2720,7 +2720,7 @@
           <a:p>
             <a:fld id="{13F24B86-36D2-4655-BE2F-98B661AC85E1}" type="datetimeFigureOut">
               <a:rPr lang="en-US" smtClean="0"/>
-              <a:t>3/19/2014</a:t>
+              <a:t>3/27/2014</a:t>
             </a:fld>
             <a:endParaRPr lang="en-US"/>
           </a:p>
@@ -4431,7 +4431,7 @@
           <p:nvPr>
             <p:extLst>
               <p:ext uri="{D42A27DB-BD31-4B8C-83A1-F6EECF244321}">
-                <p14:modId xmlns:p14="http://schemas.microsoft.com/office/powerpoint/2010/main" val="3734699103"/>
+                <p14:modId xmlns:p14="http://schemas.microsoft.com/office/powerpoint/2010/main" val="2536557759"/>
               </p:ext>
             </p:extLst>
           </p:nvPr>
@@ -4749,14 +4749,11 @@
                     <a:bodyPr/>
                     <a:lstStyle/>
                     <a:p>
-                      <a:r>
-                        <a:rPr lang="en-US" sz="1100" b="0" dirty="0" smtClean="0">
-                          <a:solidFill>
-                            <a:schemeClr val="tx1"/>
-                          </a:solidFill>
-                        </a:rPr>
-                        <a:t>Poison Ivy</a:t>
-                      </a:r>
+                      <a:endParaRPr lang="en-US" sz="1100" b="0" dirty="0" smtClean="0">
+                        <a:solidFill>
+                          <a:schemeClr val="tx1"/>
+                        </a:solidFill>
+                      </a:endParaRPr>
                     </a:p>
                   </a:txBody>
                   <a:tcPr>
@@ -5784,7 +5781,7 @@
           <p:nvPr>
             <p:extLst>
               <p:ext uri="{D42A27DB-BD31-4B8C-83A1-F6EECF244321}">
-                <p14:modId xmlns:p14="http://schemas.microsoft.com/office/powerpoint/2010/main" val="1664479027"/>
+                <p14:modId xmlns:p14="http://schemas.microsoft.com/office/powerpoint/2010/main" val="941773215"/>
               </p:ext>
             </p:extLst>
           </p:nvPr>
@@ -6102,14 +6099,11 @@
                     <a:bodyPr/>
                     <a:lstStyle/>
                     <a:p>
-                      <a:r>
-                        <a:rPr lang="en-US" sz="1100" b="0" dirty="0" smtClean="0">
-                          <a:solidFill>
-                            <a:schemeClr val="tx1"/>
-                          </a:solidFill>
-                        </a:rPr>
-                        <a:t>Poison Ivy</a:t>
-                      </a:r>
+                      <a:endParaRPr lang="en-US" sz="1100" b="0" dirty="0" smtClean="0">
+                        <a:solidFill>
+                          <a:schemeClr val="tx1"/>
+                        </a:solidFill>
+                      </a:endParaRPr>
                     </a:p>
                   </a:txBody>
                   <a:tcPr>

</xml_diff>

<commit_message>
Changed title to "Malicious files detected" which is more appropriate for such an incident. Added the Title to the XML
"Relationship" on related observables changed to "Malicious Artifact Detected" which seems more appropriate for a relationship between an incident and the malicious files detected. "Malicious Observables" seemed rather redundant on a Related_Observables relationship.

Corrected and tweaked the language in a few places.
</commit_message>
<xml_diff>
--- a/idioms/incident/related-observables/diagram.pptx
+++ b/idioms/incident/related-observables/diagram.pptx
@@ -288,7 +288,7 @@
           <a:p>
             <a:fld id="{13F24B86-36D2-4655-BE2F-98B661AC85E1}" type="datetimeFigureOut">
               <a:rPr lang="en-US" smtClean="0"/>
-              <a:t>3/27/2014</a:t>
+              <a:t>3/30/14</a:t>
             </a:fld>
             <a:endParaRPr lang="en-US"/>
           </a:p>
@@ -458,7 +458,7 @@
           <a:p>
             <a:fld id="{13F24B86-36D2-4655-BE2F-98B661AC85E1}" type="datetimeFigureOut">
               <a:rPr lang="en-US" smtClean="0"/>
-              <a:t>3/27/2014</a:t>
+              <a:t>3/30/14</a:t>
             </a:fld>
             <a:endParaRPr lang="en-US"/>
           </a:p>
@@ -638,7 +638,7 @@
           <a:p>
             <a:fld id="{13F24B86-36D2-4655-BE2F-98B661AC85E1}" type="datetimeFigureOut">
               <a:rPr lang="en-US" smtClean="0"/>
-              <a:t>3/27/2014</a:t>
+              <a:t>3/30/14</a:t>
             </a:fld>
             <a:endParaRPr lang="en-US"/>
           </a:p>
@@ -808,7 +808,7 @@
           <a:p>
             <a:fld id="{13F24B86-36D2-4655-BE2F-98B661AC85E1}" type="datetimeFigureOut">
               <a:rPr lang="en-US" smtClean="0"/>
-              <a:t>3/27/2014</a:t>
+              <a:t>3/30/14</a:t>
             </a:fld>
             <a:endParaRPr lang="en-US"/>
           </a:p>
@@ -1054,7 +1054,7 @@
           <a:p>
             <a:fld id="{13F24B86-36D2-4655-BE2F-98B661AC85E1}" type="datetimeFigureOut">
               <a:rPr lang="en-US" smtClean="0"/>
-              <a:t>3/27/2014</a:t>
+              <a:t>3/30/14</a:t>
             </a:fld>
             <a:endParaRPr lang="en-US"/>
           </a:p>
@@ -1342,7 +1342,7 @@
           <a:p>
             <a:fld id="{13F24B86-36D2-4655-BE2F-98B661AC85E1}" type="datetimeFigureOut">
               <a:rPr lang="en-US" smtClean="0"/>
-              <a:t>3/27/2014</a:t>
+              <a:t>3/30/14</a:t>
             </a:fld>
             <a:endParaRPr lang="en-US"/>
           </a:p>
@@ -1764,7 +1764,7 @@
           <a:p>
             <a:fld id="{13F24B86-36D2-4655-BE2F-98B661AC85E1}" type="datetimeFigureOut">
               <a:rPr lang="en-US" smtClean="0"/>
-              <a:t>3/27/2014</a:t>
+              <a:t>3/30/14</a:t>
             </a:fld>
             <a:endParaRPr lang="en-US"/>
           </a:p>
@@ -1882,7 +1882,7 @@
           <a:p>
             <a:fld id="{13F24B86-36D2-4655-BE2F-98B661AC85E1}" type="datetimeFigureOut">
               <a:rPr lang="en-US" smtClean="0"/>
-              <a:t>3/27/2014</a:t>
+              <a:t>3/30/14</a:t>
             </a:fld>
             <a:endParaRPr lang="en-US"/>
           </a:p>
@@ -1977,7 +1977,7 @@
           <a:p>
             <a:fld id="{13F24B86-36D2-4655-BE2F-98B661AC85E1}" type="datetimeFigureOut">
               <a:rPr lang="en-US" smtClean="0"/>
-              <a:t>3/27/2014</a:t>
+              <a:t>3/30/14</a:t>
             </a:fld>
             <a:endParaRPr lang="en-US"/>
           </a:p>
@@ -2254,7 +2254,7 @@
           <a:p>
             <a:fld id="{13F24B86-36D2-4655-BE2F-98B661AC85E1}" type="datetimeFigureOut">
               <a:rPr lang="en-US" smtClean="0"/>
-              <a:t>3/27/2014</a:t>
+              <a:t>3/30/14</a:t>
             </a:fld>
             <a:endParaRPr lang="en-US"/>
           </a:p>
@@ -2507,7 +2507,7 @@
           <a:p>
             <a:fld id="{13F24B86-36D2-4655-BE2F-98B661AC85E1}" type="datetimeFigureOut">
               <a:rPr lang="en-US" smtClean="0"/>
-              <a:t>3/27/2014</a:t>
+              <a:t>3/30/14</a:t>
             </a:fld>
             <a:endParaRPr lang="en-US"/>
           </a:p>
@@ -2720,7 +2720,7 @@
           <a:p>
             <a:fld id="{13F24B86-36D2-4655-BE2F-98B661AC85E1}" type="datetimeFigureOut">
               <a:rPr lang="en-US" smtClean="0"/>
-              <a:t>3/27/2014</a:t>
+              <a:t>3/30/14</a:t>
             </a:fld>
             <a:endParaRPr lang="en-US"/>
           </a:p>
@@ -3104,14 +3104,14 @@
           <p:nvPr>
             <p:extLst>
               <p:ext uri="{D42A27DB-BD31-4B8C-83A1-F6EECF244321}">
-                <p14:modId xmlns:p14="http://schemas.microsoft.com/office/powerpoint/2010/main" val="1459556370"/>
+                <p14:modId xmlns:p14="http://schemas.microsoft.com/office/powerpoint/2010/main" val="541182281"/>
               </p:ext>
             </p:extLst>
           </p:nvPr>
         </p:nvGraphicFramePr>
         <p:xfrm>
           <a:off x="182717" y="2109340"/>
-          <a:ext cx="3873089" cy="3596640"/>
+          <a:ext cx="3873089" cy="3429000"/>
         </p:xfrm>
         <a:graphic>
           <a:graphicData uri="http://schemas.openxmlformats.org/drawingml/2006/table">
@@ -3407,7 +3407,7 @@
                             <a:schemeClr val="tx1"/>
                           </a:solidFill>
                         </a:rPr>
-                        <a:t>Detected files delivered</a:t>
+                        <a:t>Malicious</a:t>
                       </a:r>
                       <a:r>
                         <a:rPr lang="en-US" sz="1100" b="0" baseline="0" dirty="0" smtClean="0">
@@ -3415,7 +3415,7 @@
                             <a:schemeClr val="tx1"/>
                           </a:solidFill>
                         </a:rPr>
-                        <a:t> by malicious attacker</a:t>
+                        <a:t> files detected</a:t>
                       </a:r>
                       <a:endParaRPr lang="en-US" sz="1100" b="0" dirty="0" smtClean="0">
                         <a:solidFill>
@@ -3881,8 +3881,21 @@
                             <a:schemeClr val="tx1"/>
                           </a:solidFill>
                         </a:rPr>
-                        <a:t>Malicious Observable</a:t>
+                        <a:t>Malicious </a:t>
                       </a:r>
+                      <a:r>
+                        <a:rPr lang="en-US" sz="1100" b="0" dirty="0" smtClean="0">
+                          <a:solidFill>
+                            <a:schemeClr val="tx1"/>
+                          </a:solidFill>
+                        </a:rPr>
+                        <a:t>Artifact Detected</a:t>
+                      </a:r>
+                      <a:endParaRPr lang="en-US" sz="1100" b="0" dirty="0" smtClean="0">
+                        <a:solidFill>
+                          <a:schemeClr val="tx1"/>
+                        </a:solidFill>
+                      </a:endParaRPr>
                     </a:p>
                   </a:txBody>
                   <a:tcPr>
@@ -4372,8 +4385,13 @@
                             <a:schemeClr val="tx1"/>
                           </a:solidFill>
                         </a:rPr>
-                        <a:t>Malicious Observable</a:t>
+                        <a:t>Malicious Artifact Detected</a:t>
                       </a:r>
+                      <a:endParaRPr lang="en-US" sz="1100" b="0" dirty="0" smtClean="0">
+                        <a:solidFill>
+                          <a:schemeClr val="tx1"/>
+                        </a:solidFill>
+                      </a:endParaRPr>
                     </a:p>
                   </a:txBody>
                   <a:tcPr>

</xml_diff>

<commit_message>
Apparently the previous commit was not the latest saved version.
</commit_message>
<xml_diff>
--- a/idioms/incident/related-observables/diagram.pptx
+++ b/idioms/incident/related-observables/diagram.pptx
@@ -3104,7 +3104,7 @@
           <p:nvPr>
             <p:extLst>
               <p:ext uri="{D42A27DB-BD31-4B8C-83A1-F6EECF244321}">
-                <p14:modId xmlns:p14="http://schemas.microsoft.com/office/powerpoint/2010/main" val="541182281"/>
+                <p14:modId xmlns:p14="http://schemas.microsoft.com/office/powerpoint/2010/main" val="298559047"/>
               </p:ext>
             </p:extLst>
           </p:nvPr>
@@ -4449,7 +4449,7 @@
           <p:nvPr>
             <p:extLst>
               <p:ext uri="{D42A27DB-BD31-4B8C-83A1-F6EECF244321}">
-                <p14:modId xmlns:p14="http://schemas.microsoft.com/office/powerpoint/2010/main" val="2536557759"/>
+                <p14:modId xmlns:p14="http://schemas.microsoft.com/office/powerpoint/2010/main" val="1699071546"/>
               </p:ext>
             </p:extLst>
           </p:nvPr>
@@ -5799,7 +5799,7 @@
           <p:nvPr>
             <p:extLst>
               <p:ext uri="{D42A27DB-BD31-4B8C-83A1-F6EECF244321}">
-                <p14:modId xmlns:p14="http://schemas.microsoft.com/office/powerpoint/2010/main" val="941773215"/>
+                <p14:modId xmlns:p14="http://schemas.microsoft.com/office/powerpoint/2010/main" val="650514547"/>
               </p:ext>
             </p:extLst>
           </p:nvPr>

</xml_diff>

<commit_message>
A couple diagrams were too big, resized them to match others
</commit_message>
<xml_diff>
--- a/idioms/incident/related-observables/diagram.pptx
+++ b/idioms/incident/related-observables/diagram.pptx
@@ -288,7 +288,7 @@
           <a:p>
             <a:fld id="{13F24B86-36D2-4655-BE2F-98B661AC85E1}" type="datetimeFigureOut">
               <a:rPr lang="en-US" smtClean="0"/>
-              <a:t>3/30/14</a:t>
+              <a:t>3/31/2014</a:t>
             </a:fld>
             <a:endParaRPr lang="en-US"/>
           </a:p>
@@ -458,7 +458,7 @@
           <a:p>
             <a:fld id="{13F24B86-36D2-4655-BE2F-98B661AC85E1}" type="datetimeFigureOut">
               <a:rPr lang="en-US" smtClean="0"/>
-              <a:t>3/30/14</a:t>
+              <a:t>3/31/2014</a:t>
             </a:fld>
             <a:endParaRPr lang="en-US"/>
           </a:p>
@@ -638,7 +638,7 @@
           <a:p>
             <a:fld id="{13F24B86-36D2-4655-BE2F-98B661AC85E1}" type="datetimeFigureOut">
               <a:rPr lang="en-US" smtClean="0"/>
-              <a:t>3/30/14</a:t>
+              <a:t>3/31/2014</a:t>
             </a:fld>
             <a:endParaRPr lang="en-US"/>
           </a:p>
@@ -808,7 +808,7 @@
           <a:p>
             <a:fld id="{13F24B86-36D2-4655-BE2F-98B661AC85E1}" type="datetimeFigureOut">
               <a:rPr lang="en-US" smtClean="0"/>
-              <a:t>3/30/14</a:t>
+              <a:t>3/31/2014</a:t>
             </a:fld>
             <a:endParaRPr lang="en-US"/>
           </a:p>
@@ -1054,7 +1054,7 @@
           <a:p>
             <a:fld id="{13F24B86-36D2-4655-BE2F-98B661AC85E1}" type="datetimeFigureOut">
               <a:rPr lang="en-US" smtClean="0"/>
-              <a:t>3/30/14</a:t>
+              <a:t>3/31/2014</a:t>
             </a:fld>
             <a:endParaRPr lang="en-US"/>
           </a:p>
@@ -1342,7 +1342,7 @@
           <a:p>
             <a:fld id="{13F24B86-36D2-4655-BE2F-98B661AC85E1}" type="datetimeFigureOut">
               <a:rPr lang="en-US" smtClean="0"/>
-              <a:t>3/30/14</a:t>
+              <a:t>3/31/2014</a:t>
             </a:fld>
             <a:endParaRPr lang="en-US"/>
           </a:p>
@@ -1764,7 +1764,7 @@
           <a:p>
             <a:fld id="{13F24B86-36D2-4655-BE2F-98B661AC85E1}" type="datetimeFigureOut">
               <a:rPr lang="en-US" smtClean="0"/>
-              <a:t>3/30/14</a:t>
+              <a:t>3/31/2014</a:t>
             </a:fld>
             <a:endParaRPr lang="en-US"/>
           </a:p>
@@ -1882,7 +1882,7 @@
           <a:p>
             <a:fld id="{13F24B86-36D2-4655-BE2F-98B661AC85E1}" type="datetimeFigureOut">
               <a:rPr lang="en-US" smtClean="0"/>
-              <a:t>3/30/14</a:t>
+              <a:t>3/31/2014</a:t>
             </a:fld>
             <a:endParaRPr lang="en-US"/>
           </a:p>
@@ -1977,7 +1977,7 @@
           <a:p>
             <a:fld id="{13F24B86-36D2-4655-BE2F-98B661AC85E1}" type="datetimeFigureOut">
               <a:rPr lang="en-US" smtClean="0"/>
-              <a:t>3/30/14</a:t>
+              <a:t>3/31/2014</a:t>
             </a:fld>
             <a:endParaRPr lang="en-US"/>
           </a:p>
@@ -2254,7 +2254,7 @@
           <a:p>
             <a:fld id="{13F24B86-36D2-4655-BE2F-98B661AC85E1}" type="datetimeFigureOut">
               <a:rPr lang="en-US" smtClean="0"/>
-              <a:t>3/30/14</a:t>
+              <a:t>3/31/2014</a:t>
             </a:fld>
             <a:endParaRPr lang="en-US"/>
           </a:p>
@@ -2507,7 +2507,7 @@
           <a:p>
             <a:fld id="{13F24B86-36D2-4655-BE2F-98B661AC85E1}" type="datetimeFigureOut">
               <a:rPr lang="en-US" smtClean="0"/>
-              <a:t>3/30/14</a:t>
+              <a:t>3/31/2014</a:t>
             </a:fld>
             <a:endParaRPr lang="en-US"/>
           </a:p>
@@ -2720,7 +2720,7 @@
           <a:p>
             <a:fld id="{13F24B86-36D2-4655-BE2F-98B661AC85E1}" type="datetimeFigureOut">
               <a:rPr lang="en-US" smtClean="0"/>
-              <a:t>3/30/14</a:t>
+              <a:t>3/31/2014</a:t>
             </a:fld>
             <a:endParaRPr lang="en-US"/>
           </a:p>
@@ -3104,7 +3104,7 @@
           <p:nvPr>
             <p:extLst>
               <p:ext uri="{D42A27DB-BD31-4B8C-83A1-F6EECF244321}">
-                <p14:modId xmlns:p14="http://schemas.microsoft.com/office/powerpoint/2010/main" val="298559047"/>
+                <p14:modId xmlns:p14="http://schemas.microsoft.com/office/powerpoint/2010/main" val="4259185989"/>
               </p:ext>
             </p:extLst>
           </p:nvPr>
@@ -3881,21 +3881,8 @@
                             <a:schemeClr val="tx1"/>
                           </a:solidFill>
                         </a:rPr>
-                        <a:t>Malicious </a:t>
+                        <a:t>Malicious Artifact Detected</a:t>
                       </a:r>
-                      <a:r>
-                        <a:rPr lang="en-US" sz="1100" b="0" dirty="0" smtClean="0">
-                          <a:solidFill>
-                            <a:schemeClr val="tx1"/>
-                          </a:solidFill>
-                        </a:rPr>
-                        <a:t>Artifact Detected</a:t>
-                      </a:r>
-                      <a:endParaRPr lang="en-US" sz="1100" b="0" dirty="0" smtClean="0">
-                        <a:solidFill>
-                          <a:schemeClr val="tx1"/>
-                        </a:solidFill>
-                      </a:endParaRPr>
                     </a:p>
                   </a:txBody>
                   <a:tcPr>
@@ -4387,11 +4374,6 @@
                         </a:rPr>
                         <a:t>Malicious Artifact Detected</a:t>
                       </a:r>
-                      <a:endParaRPr lang="en-US" sz="1100" b="0" dirty="0" smtClean="0">
-                        <a:solidFill>
-                          <a:schemeClr val="tx1"/>
-                        </a:solidFill>
-                      </a:endParaRPr>
                     </a:p>
                   </a:txBody>
                   <a:tcPr>

</xml_diff>